<commit_message>
📚 docs: Refactor documentation and update README.md
- Added a demo section with an image to `README.md`.
- Updated tools and libraries sections in `README.md`.
- Reorganized license and acknowledgments sections in `README.md`.
- Removed outdated markdown files:
  - `conventional_commit-message_emojis.md`
  - `conventional_commit_messages.md`
  - `dotnetlayout.md`
- Removed learning resources from `learn-path.txt`.
- Added a comment in `Next-Solution.WebApi.csproj` to explain a conditional compilation block.
</commit_message>
<xml_diff>
--- a/docs/images/banner.pptx
+++ b/docs/images/banner.pptx
@@ -243,7 +243,7 @@
           <a:p>
             <a:fld id="{36315F81-BEF3-4F9B-AC41-522F2A5A8578}" type="datetimeFigureOut">
               <a:rPr lang="en-GH" smtClean="0"/>
-              <a:t>14/08/2024</a:t>
+              <a:t>15/08/2024</a:t>
             </a:fld>
             <a:endParaRPr lang="en-GH" dirty="0"/>
           </a:p>
@@ -413,7 +413,7 @@
           <a:p>
             <a:fld id="{36315F81-BEF3-4F9B-AC41-522F2A5A8578}" type="datetimeFigureOut">
               <a:rPr lang="en-GH" smtClean="0"/>
-              <a:t>14/08/2024</a:t>
+              <a:t>15/08/2024</a:t>
             </a:fld>
             <a:endParaRPr lang="en-GH" dirty="0"/>
           </a:p>
@@ -593,7 +593,7 @@
           <a:p>
             <a:fld id="{36315F81-BEF3-4F9B-AC41-522F2A5A8578}" type="datetimeFigureOut">
               <a:rPr lang="en-GH" smtClean="0"/>
-              <a:t>14/08/2024</a:t>
+              <a:t>15/08/2024</a:t>
             </a:fld>
             <a:endParaRPr lang="en-GH" dirty="0"/>
           </a:p>
@@ -763,7 +763,7 @@
           <a:p>
             <a:fld id="{36315F81-BEF3-4F9B-AC41-522F2A5A8578}" type="datetimeFigureOut">
               <a:rPr lang="en-GH" smtClean="0"/>
-              <a:t>14/08/2024</a:t>
+              <a:t>15/08/2024</a:t>
             </a:fld>
             <a:endParaRPr lang="en-GH" dirty="0"/>
           </a:p>
@@ -1009,7 +1009,7 @@
           <a:p>
             <a:fld id="{36315F81-BEF3-4F9B-AC41-522F2A5A8578}" type="datetimeFigureOut">
               <a:rPr lang="en-GH" smtClean="0"/>
-              <a:t>14/08/2024</a:t>
+              <a:t>15/08/2024</a:t>
             </a:fld>
             <a:endParaRPr lang="en-GH" dirty="0"/>
           </a:p>
@@ -1241,7 +1241,7 @@
           <a:p>
             <a:fld id="{36315F81-BEF3-4F9B-AC41-522F2A5A8578}" type="datetimeFigureOut">
               <a:rPr lang="en-GH" smtClean="0"/>
-              <a:t>14/08/2024</a:t>
+              <a:t>15/08/2024</a:t>
             </a:fld>
             <a:endParaRPr lang="en-GH" dirty="0"/>
           </a:p>
@@ -1608,7 +1608,7 @@
           <a:p>
             <a:fld id="{36315F81-BEF3-4F9B-AC41-522F2A5A8578}" type="datetimeFigureOut">
               <a:rPr lang="en-GH" smtClean="0"/>
-              <a:t>14/08/2024</a:t>
+              <a:t>15/08/2024</a:t>
             </a:fld>
             <a:endParaRPr lang="en-GH" dirty="0"/>
           </a:p>
@@ -1726,7 +1726,7 @@
           <a:p>
             <a:fld id="{36315F81-BEF3-4F9B-AC41-522F2A5A8578}" type="datetimeFigureOut">
               <a:rPr lang="en-GH" smtClean="0"/>
-              <a:t>14/08/2024</a:t>
+              <a:t>15/08/2024</a:t>
             </a:fld>
             <a:endParaRPr lang="en-GH" dirty="0"/>
           </a:p>
@@ -1821,7 +1821,7 @@
           <a:p>
             <a:fld id="{36315F81-BEF3-4F9B-AC41-522F2A5A8578}" type="datetimeFigureOut">
               <a:rPr lang="en-GH" smtClean="0"/>
-              <a:t>14/08/2024</a:t>
+              <a:t>15/08/2024</a:t>
             </a:fld>
             <a:endParaRPr lang="en-GH" dirty="0"/>
           </a:p>
@@ -2098,7 +2098,7 @@
           <a:p>
             <a:fld id="{36315F81-BEF3-4F9B-AC41-522F2A5A8578}" type="datetimeFigureOut">
               <a:rPr lang="en-GH" smtClean="0"/>
-              <a:t>14/08/2024</a:t>
+              <a:t>15/08/2024</a:t>
             </a:fld>
             <a:endParaRPr lang="en-GH" dirty="0"/>
           </a:p>
@@ -2355,7 +2355,7 @@
           <a:p>
             <a:fld id="{36315F81-BEF3-4F9B-AC41-522F2A5A8578}" type="datetimeFigureOut">
               <a:rPr lang="en-GH" smtClean="0"/>
-              <a:t>14/08/2024</a:t>
+              <a:t>15/08/2024</a:t>
             </a:fld>
             <a:endParaRPr lang="en-GH" dirty="0"/>
           </a:p>
@@ -2568,7 +2568,7 @@
           <a:p>
             <a:fld id="{36315F81-BEF3-4F9B-AC41-522F2A5A8578}" type="datetimeFigureOut">
               <a:rPr lang="en-GH" smtClean="0"/>
-              <a:t>14/08/2024</a:t>
+              <a:t>15/08/2024</a:t>
             </a:fld>
             <a:endParaRPr lang="en-GH" dirty="0"/>
           </a:p>
@@ -3001,7 +3001,7 @@
         </p:blipFill>
         <p:spPr>
           <a:xfrm>
-            <a:off x="18434968" y="5444192"/>
+            <a:off x="18434968" y="3148667"/>
             <a:ext cx="7021264" cy="7021264"/>
           </a:xfrm>
           <a:prstGeom prst="rect">
@@ -3026,7 +3026,7 @@
         </p:nvSpPr>
         <p:spPr>
           <a:xfrm>
-            <a:off x="13054704" y="13434570"/>
+            <a:off x="13054704" y="11139045"/>
             <a:ext cx="20271896" cy="2800767"/>
           </a:xfrm>
           <a:prstGeom prst="rect">
@@ -3081,8 +3081,8 @@
         </p:nvSpPr>
         <p:spPr>
           <a:xfrm>
-            <a:off x="7440988" y="16512332"/>
-            <a:ext cx="30232956" cy="1077218"/>
+            <a:off x="6082485" y="14334487"/>
+            <a:ext cx="31726231" cy="2062103"/>
           </a:xfrm>
           <a:prstGeom prst="rect">
             <a:avLst/>
@@ -3090,17 +3090,60 @@
           <a:noFill/>
         </p:spPr>
         <p:txBody>
-          <a:bodyPr wrap="none" rtlCol="0">
+          <a:bodyPr wrap="square" rtlCol="0">
             <a:spAutoFit/>
           </a:bodyPr>
           <a:lstStyle/>
           <a:p>
+            <a:pPr algn="ctr"/>
             <a:r>
               <a:rPr lang="en-US" sz="6400" dirty="0">
                 <a:latin typeface="Roboto" panose="02000000000000000000" pitchFamily="2" charset="0"/>
                 <a:ea typeface="Roboto" panose="02000000000000000000" pitchFamily="2" charset="0"/>
               </a:rPr>
-              <a:t>A starter solution template for rapidly creating a modern and efficient applications.</a:t>
+              <a:t>A starter solution template for rapidly creating a modern and efficient applications in </a:t>
+            </a:r>
+            <a:r>
+              <a:rPr lang="en-US" sz="6400" b="1" dirty="0">
+                <a:latin typeface="Roboto" panose="02000000000000000000" pitchFamily="2" charset="0"/>
+                <a:ea typeface="Roboto" panose="02000000000000000000" pitchFamily="2" charset="0"/>
+              </a:rPr>
+              <a:t>ASP.NET</a:t>
+            </a:r>
+            <a:r>
+              <a:rPr lang="en-US" sz="6400" dirty="0">
+                <a:latin typeface="Roboto" panose="02000000000000000000" pitchFamily="2" charset="0"/>
+                <a:ea typeface="Roboto" panose="02000000000000000000" pitchFamily="2" charset="0"/>
+              </a:rPr>
+              <a:t> with </a:t>
+            </a:r>
+            <a:r>
+              <a:rPr lang="en-US" sz="6400" b="1" dirty="0">
+                <a:latin typeface="Roboto" panose="02000000000000000000" pitchFamily="2" charset="0"/>
+                <a:ea typeface="Roboto" panose="02000000000000000000" pitchFamily="2" charset="0"/>
+              </a:rPr>
+              <a:t>Next.js</a:t>
+            </a:r>
+            <a:r>
+              <a:rPr lang="en-US" sz="6400" dirty="0">
+                <a:latin typeface="Roboto" panose="02000000000000000000" pitchFamily="2" charset="0"/>
+                <a:ea typeface="Roboto" panose="02000000000000000000" pitchFamily="2" charset="0"/>
+              </a:rPr>
+              <a:t> or </a:t>
+            </a:r>
+            <a:r>
+              <a:rPr lang="en-US" sz="6400" b="1" dirty="0" err="1">
+                <a:latin typeface="Roboto" panose="02000000000000000000" pitchFamily="2" charset="0"/>
+                <a:ea typeface="Roboto" panose="02000000000000000000" pitchFamily="2" charset="0"/>
+              </a:rPr>
+              <a:t>Expo.dev</a:t>
+            </a:r>
+            <a:r>
+              <a:rPr lang="en-US" sz="6400" dirty="0">
+                <a:latin typeface="Roboto" panose="02000000000000000000" pitchFamily="2" charset="0"/>
+                <a:ea typeface="Roboto" panose="02000000000000000000" pitchFamily="2" charset="0"/>
+              </a:rPr>
+              <a:t>.</a:t>
             </a:r>
             <a:endParaRPr lang="en-GH" sz="6400" dirty="0">
               <a:latin typeface="Roboto" panose="02000000000000000000" pitchFamily="2" charset="0"/>
@@ -3131,19 +3174,374 @@
               </a:ext>
             </a:extLst>
           </a:blip>
-          <a:srcRect l="47444"/>
+          <a:srcRect l="47444" t="13015"/>
           <a:stretch/>
         </p:blipFill>
         <p:spPr>
           <a:xfrm>
-            <a:off x="33406080" y="-1484946"/>
-            <a:ext cx="10485120" cy="11409340"/>
+            <a:off x="33406080" y="0"/>
+            <a:ext cx="10485120" cy="9924394"/>
           </a:xfrm>
           <a:prstGeom prst="rect">
             <a:avLst/>
           </a:prstGeom>
         </p:spPr>
       </p:pic>
+      <p:grpSp>
+        <p:nvGrpSpPr>
+          <p:cNvPr id="24" name="Group 23">
+            <a:extLst>
+              <a:ext uri="{FF2B5EF4-FFF2-40B4-BE49-F238E27FC236}">
+                <a16:creationId xmlns:a16="http://schemas.microsoft.com/office/drawing/2014/main" id="{8AE620A7-D502-9D8D-9723-07C319166DEF}"/>
+              </a:ext>
+            </a:extLst>
+          </p:cNvPr>
+          <p:cNvGrpSpPr/>
+          <p:nvPr/>
+        </p:nvGrpSpPr>
+        <p:grpSpPr>
+          <a:xfrm>
+            <a:off x="18817890" y="17769612"/>
+            <a:ext cx="6255420" cy="1764558"/>
+            <a:chOff x="17640900" y="17105591"/>
+            <a:chExt cx="8609400" cy="2428579"/>
+          </a:xfrm>
+        </p:grpSpPr>
+        <p:pic>
+          <p:nvPicPr>
+            <p:cNvPr id="4" name="Picture 3" descr="A blue and white sign&#10;&#10;Description automatically generated">
+              <a:extLst>
+                <a:ext uri="{FF2B5EF4-FFF2-40B4-BE49-F238E27FC236}">
+                  <a16:creationId xmlns:a16="http://schemas.microsoft.com/office/drawing/2014/main" id="{29E6C3C2-ECDB-37FD-D34A-AA0F018AFBC6}"/>
+                </a:ext>
+              </a:extLst>
+            </p:cNvPr>
+            <p:cNvPicPr>
+              <a:picLocks noChangeAspect="1"/>
+            </p:cNvPicPr>
+            <p:nvPr/>
+          </p:nvPicPr>
+          <p:blipFill>
+            <a:blip r:embed="rId4">
+              <a:extLst>
+                <a:ext uri="{28A0092B-C50C-407E-A947-70E740481C1C}">
+                  <a14:useLocalDpi xmlns:a14="http://schemas.microsoft.com/office/drawing/2010/main" val="0"/>
+                </a:ext>
+              </a:extLst>
+            </a:blip>
+            <a:stretch>
+              <a:fillRect/>
+            </a:stretch>
+          </p:blipFill>
+          <p:spPr>
+            <a:xfrm>
+              <a:off x="17640900" y="17105591"/>
+              <a:ext cx="2368531" cy="2368531"/>
+            </a:xfrm>
+            <a:prstGeom prst="rect">
+              <a:avLst/>
+            </a:prstGeom>
+          </p:spPr>
+        </p:pic>
+        <p:pic>
+          <p:nvPicPr>
+            <p:cNvPr id="6" name="Picture 5" descr="A white letter on a black background&#10;&#10;Description automatically generated">
+              <a:extLst>
+                <a:ext uri="{FF2B5EF4-FFF2-40B4-BE49-F238E27FC236}">
+                  <a16:creationId xmlns:a16="http://schemas.microsoft.com/office/drawing/2014/main" id="{BECE4A40-C074-7D9E-5651-C1832EF45BA3}"/>
+                </a:ext>
+              </a:extLst>
+            </p:cNvPr>
+            <p:cNvPicPr>
+              <a:picLocks noChangeAspect="1"/>
+            </p:cNvPicPr>
+            <p:nvPr/>
+          </p:nvPicPr>
+          <p:blipFill>
+            <a:blip r:embed="rId5">
+              <a:extLst>
+                <a:ext uri="{28A0092B-C50C-407E-A947-70E740481C1C}">
+                  <a14:useLocalDpi xmlns:a14="http://schemas.microsoft.com/office/drawing/2010/main" val="0"/>
+                </a:ext>
+              </a:extLst>
+            </a:blip>
+            <a:stretch>
+              <a:fillRect/>
+            </a:stretch>
+          </p:blipFill>
+          <p:spPr>
+            <a:xfrm>
+              <a:off x="20904830" y="17105591"/>
+              <a:ext cx="2368531" cy="2368531"/>
+            </a:xfrm>
+            <a:prstGeom prst="rect">
+              <a:avLst/>
+            </a:prstGeom>
+            <a:ln>
+              <a:noFill/>
+            </a:ln>
+          </p:spPr>
+        </p:pic>
+        <p:pic>
+          <p:nvPicPr>
+            <p:cNvPr id="12" name="Picture 11" descr="A logo of a number&#10;&#10;Description automatically generated">
+              <a:extLst>
+                <a:ext uri="{FF2B5EF4-FFF2-40B4-BE49-F238E27FC236}">
+                  <a16:creationId xmlns:a16="http://schemas.microsoft.com/office/drawing/2014/main" id="{AE01FFA6-5435-3181-E927-6458FCDEA9CA}"/>
+                </a:ext>
+              </a:extLst>
+            </p:cNvPr>
+            <p:cNvPicPr>
+              <a:picLocks noChangeAspect="1"/>
+            </p:cNvPicPr>
+            <p:nvPr/>
+          </p:nvPicPr>
+          <p:blipFill>
+            <a:blip r:embed="rId6">
+              <a:extLst>
+                <a:ext uri="{28A0092B-C50C-407E-A947-70E740481C1C}">
+                  <a14:useLocalDpi xmlns:a14="http://schemas.microsoft.com/office/drawing/2010/main" val="0"/>
+                </a:ext>
+              </a:extLst>
+            </a:blip>
+            <a:stretch>
+              <a:fillRect/>
+            </a:stretch>
+          </p:blipFill>
+          <p:spPr>
+            <a:xfrm>
+              <a:off x="23881769" y="17165639"/>
+              <a:ext cx="2368531" cy="2368531"/>
+            </a:xfrm>
+            <a:prstGeom prst="rect">
+              <a:avLst/>
+            </a:prstGeom>
+            <a:ln>
+              <a:noFill/>
+            </a:ln>
+          </p:spPr>
+        </p:pic>
+        <p:grpSp>
+          <p:nvGrpSpPr>
+            <p:cNvPr id="16" name="Group 15">
+              <a:extLst>
+                <a:ext uri="{FF2B5EF4-FFF2-40B4-BE49-F238E27FC236}">
+                  <a16:creationId xmlns:a16="http://schemas.microsoft.com/office/drawing/2014/main" id="{610CEBF8-8C9E-4E18-9AB6-C7DFF73BB92F}"/>
+                </a:ext>
+              </a:extLst>
+            </p:cNvPr>
+            <p:cNvGrpSpPr/>
+            <p:nvPr/>
+          </p:nvGrpSpPr>
+          <p:grpSpPr>
+            <a:xfrm>
+              <a:off x="25456232" y="18756136"/>
+              <a:ext cx="778034" cy="778034"/>
+              <a:chOff x="29489399" y="6915149"/>
+              <a:chExt cx="2018849" cy="2018849"/>
+            </a:xfrm>
+          </p:grpSpPr>
+          <p:sp>
+            <p:nvSpPr>
+              <p:cNvPr id="17" name="Oval 16">
+                <a:extLst>
+                  <a:ext uri="{FF2B5EF4-FFF2-40B4-BE49-F238E27FC236}">
+                    <a16:creationId xmlns:a16="http://schemas.microsoft.com/office/drawing/2014/main" id="{86F95755-4136-9A23-90D2-CA0EE76D05E7}"/>
+                  </a:ext>
+                </a:extLst>
+              </p:cNvPr>
+              <p:cNvSpPr/>
+              <p:nvPr/>
+            </p:nvSpPr>
+            <p:spPr>
+              <a:xfrm>
+                <a:off x="29489399" y="6915149"/>
+                <a:ext cx="2018849" cy="2018849"/>
+              </a:xfrm>
+              <a:prstGeom prst="ellipse">
+                <a:avLst/>
+              </a:prstGeom>
+              <a:solidFill>
+                <a:srgbClr val="000020"/>
+              </a:solidFill>
+              <a:ln>
+                <a:noFill/>
+              </a:ln>
+              <a:effectLst/>
+            </p:spPr>
+            <p:style>
+              <a:lnRef idx="2">
+                <a:schemeClr val="accent1">
+                  <a:shade val="15000"/>
+                </a:schemeClr>
+              </a:lnRef>
+              <a:fillRef idx="1">
+                <a:schemeClr val="accent1"/>
+              </a:fillRef>
+              <a:effectRef idx="0">
+                <a:schemeClr val="accent1"/>
+              </a:effectRef>
+              <a:fontRef idx="minor">
+                <a:schemeClr val="lt1"/>
+              </a:fontRef>
+            </p:style>
+            <p:txBody>
+              <a:bodyPr rtlCol="0" anchor="ctr"/>
+              <a:lstStyle/>
+              <a:p>
+                <a:pPr algn="ctr"/>
+                <a:endParaRPr lang="en-GH" dirty="0"/>
+              </a:p>
+            </p:txBody>
+          </p:sp>
+          <p:pic>
+            <p:nvPicPr>
+              <p:cNvPr id="18" name="Picture 17" descr="A blue and black symbol&#10;&#10;Description automatically generated">
+                <a:extLst>
+                  <a:ext uri="{FF2B5EF4-FFF2-40B4-BE49-F238E27FC236}">
+                    <a16:creationId xmlns:a16="http://schemas.microsoft.com/office/drawing/2014/main" id="{3390814A-A786-A045-F67C-5F9E02760B50}"/>
+                  </a:ext>
+                </a:extLst>
+              </p:cNvPr>
+              <p:cNvPicPr>
+                <a:picLocks noChangeAspect="1"/>
+              </p:cNvPicPr>
+              <p:nvPr/>
+            </p:nvPicPr>
+            <p:blipFill>
+              <a:blip r:embed="rId7">
+                <a:extLst>
+                  <a:ext uri="{28A0092B-C50C-407E-A947-70E740481C1C}">
+                    <a14:useLocalDpi xmlns:a14="http://schemas.microsoft.com/office/drawing/2010/main" val="0"/>
+                  </a:ext>
+                </a:extLst>
+              </a:blip>
+              <a:stretch>
+                <a:fillRect/>
+              </a:stretch>
+            </p:blipFill>
+            <p:spPr>
+              <a:xfrm>
+                <a:off x="29775828" y="7201578"/>
+                <a:ext cx="1445990" cy="1445990"/>
+              </a:xfrm>
+              <a:prstGeom prst="rect">
+                <a:avLst/>
+              </a:prstGeom>
+            </p:spPr>
+          </p:pic>
+        </p:grpSp>
+        <p:grpSp>
+          <p:nvGrpSpPr>
+            <p:cNvPr id="19" name="Group 18">
+              <a:extLst>
+                <a:ext uri="{FF2B5EF4-FFF2-40B4-BE49-F238E27FC236}">
+                  <a16:creationId xmlns:a16="http://schemas.microsoft.com/office/drawing/2014/main" id="{AE93918F-9C52-BA18-E722-32C7F0DA1AA5}"/>
+                </a:ext>
+              </a:extLst>
+            </p:cNvPr>
+            <p:cNvGrpSpPr/>
+            <p:nvPr/>
+          </p:nvGrpSpPr>
+          <p:grpSpPr>
+            <a:xfrm>
+              <a:off x="22495327" y="18696088"/>
+              <a:ext cx="778034" cy="778034"/>
+              <a:chOff x="29489387" y="6915149"/>
+              <a:chExt cx="2018848" cy="2018849"/>
+            </a:xfrm>
+          </p:grpSpPr>
+          <p:sp>
+            <p:nvSpPr>
+              <p:cNvPr id="20" name="Oval 19">
+                <a:extLst>
+                  <a:ext uri="{FF2B5EF4-FFF2-40B4-BE49-F238E27FC236}">
+                    <a16:creationId xmlns:a16="http://schemas.microsoft.com/office/drawing/2014/main" id="{52AEE243-6DDA-697B-AF15-E2723F407806}"/>
+                  </a:ext>
+                </a:extLst>
+              </p:cNvPr>
+              <p:cNvSpPr/>
+              <p:nvPr/>
+            </p:nvSpPr>
+            <p:spPr>
+              <a:xfrm>
+                <a:off x="29489387" y="6915149"/>
+                <a:ext cx="2018848" cy="2018849"/>
+              </a:xfrm>
+              <a:prstGeom prst="ellipse">
+                <a:avLst/>
+              </a:prstGeom>
+              <a:solidFill>
+                <a:schemeClr val="bg1"/>
+              </a:solidFill>
+              <a:ln>
+                <a:noFill/>
+              </a:ln>
+              <a:effectLst/>
+            </p:spPr>
+            <p:style>
+              <a:lnRef idx="2">
+                <a:schemeClr val="accent1">
+                  <a:shade val="15000"/>
+                </a:schemeClr>
+              </a:lnRef>
+              <a:fillRef idx="1">
+                <a:schemeClr val="accent1"/>
+              </a:fillRef>
+              <a:effectRef idx="0">
+                <a:schemeClr val="accent1"/>
+              </a:effectRef>
+              <a:fontRef idx="minor">
+                <a:schemeClr val="lt1"/>
+              </a:fontRef>
+            </p:style>
+            <p:txBody>
+              <a:bodyPr rtlCol="0" anchor="ctr"/>
+              <a:lstStyle/>
+              <a:p>
+                <a:pPr algn="ctr"/>
+                <a:endParaRPr lang="en-GH" dirty="0"/>
+              </a:p>
+            </p:txBody>
+          </p:sp>
+          <p:pic>
+            <p:nvPicPr>
+              <p:cNvPr id="21" name="Picture 20" descr="A blue and black symbol&#10;&#10;Description automatically generated">
+                <a:extLst>
+                  <a:ext uri="{FF2B5EF4-FFF2-40B4-BE49-F238E27FC236}">
+                    <a16:creationId xmlns:a16="http://schemas.microsoft.com/office/drawing/2014/main" id="{33E6D13F-A4E9-F70E-8216-9F21E8E3F545}"/>
+                  </a:ext>
+                </a:extLst>
+              </p:cNvPr>
+              <p:cNvPicPr>
+                <a:picLocks noChangeAspect="1"/>
+              </p:cNvPicPr>
+              <p:nvPr/>
+            </p:nvPicPr>
+            <p:blipFill>
+              <a:blip r:embed="rId7">
+                <a:extLst>
+                  <a:ext uri="{28A0092B-C50C-407E-A947-70E740481C1C}">
+                    <a14:useLocalDpi xmlns:a14="http://schemas.microsoft.com/office/drawing/2010/main" val="0"/>
+                  </a:ext>
+                </a:extLst>
+              </a:blip>
+              <a:stretch>
+                <a:fillRect/>
+              </a:stretch>
+            </p:blipFill>
+            <p:spPr>
+              <a:xfrm>
+                <a:off x="29775828" y="7201578"/>
+                <a:ext cx="1445990" cy="1445990"/>
+              </a:xfrm>
+              <a:prstGeom prst="rect">
+                <a:avLst/>
+              </a:prstGeom>
+            </p:spPr>
+          </p:pic>
+        </p:grpSp>
+      </p:grpSp>
     </p:spTree>
     <p:extLst>
       <p:ext uri="{BB962C8B-B14F-4D97-AF65-F5344CB8AC3E}">

</xml_diff>

<commit_message>
📄 docs: Update README and change logo image source
- Added a "Motivation" section to `README.md`, detailing the inspiration behind V2 of the NextSolution template and encouraging contributions and sponsorship.
- Updated the logo image source in `reset-password-screen.tsx`, `sign-in-screen.tsx`, `sign-up-screen.tsx`, and `welcome-screen.tsx` from `app-logo-256x256.png` to `icon.png`.
</commit_message>
<xml_diff>
--- a/docs/images/banner.pptx
+++ b/docs/images/banner.pptx
@@ -3122,14 +3122,21 @@
                 <a:latin typeface="Roboto" panose="02000000000000000000" pitchFamily="2" charset="0"/>
                 <a:ea typeface="Roboto" panose="02000000000000000000" pitchFamily="2" charset="0"/>
               </a:rPr>
-              <a:t>Next.js</a:t>
-            </a:r>
-            <a:r>
-              <a:rPr lang="en-US" sz="6400" dirty="0">
+              <a:t>Next.</a:t>
+            </a:r>
+            <a:r>
+              <a:rPr lang="en-US" sz="6400" b="1">
                 <a:latin typeface="Roboto" panose="02000000000000000000" pitchFamily="2" charset="0"/>
                 <a:ea typeface="Roboto" panose="02000000000000000000" pitchFamily="2" charset="0"/>
               </a:rPr>
-              <a:t> or </a:t>
+              <a:t>js</a:t>
+            </a:r>
+            <a:r>
+              <a:rPr lang="en-US" sz="6400">
+                <a:latin typeface="Roboto" panose="02000000000000000000" pitchFamily="2" charset="0"/>
+                <a:ea typeface="Roboto" panose="02000000000000000000" pitchFamily="2" charset="0"/>
+              </a:rPr>
+              <a:t> and </a:t>
             </a:r>
             <a:r>
               <a:rPr lang="en-US" sz="6400" b="1" dirty="0" err="1">

</xml_diff>

<commit_message>
🔧 refactor: Update configs, add env var, new services and utilities
- Reordered imports and added a new rule in `prettier.config.js`.
- Added `NEXT_PUBLIC_SERVER_URL` to `.env` and `next.config.mjs`.
- Updated `.prettierignore` to exclude specific directories and files.
- Changed project name to "next-solution" in `package.json`, added Prettier scripts, and included new dependencies.
- Introduced `IdentityService` in `identity-service.ts`.
- Set up Axios instance and `IdentityService` in `index.tsx`.
- Added `Result` class and subclasses, defined types, and exported everything from the identity module.
- Added utility functions in `index.ts`.
- Modified exception message in `NgrokProcess.cs`.
</commit_message>
<xml_diff>
--- a/docs/images/banner.pptx
+++ b/docs/images/banner.pptx
@@ -243,7 +243,7 @@
           <a:p>
             <a:fld id="{36315F81-BEF3-4F9B-AC41-522F2A5A8578}" type="datetimeFigureOut">
               <a:rPr lang="en-GH" smtClean="0"/>
-              <a:t>15/08/2024</a:t>
+              <a:t>20/08/2024</a:t>
             </a:fld>
             <a:endParaRPr lang="en-GH" dirty="0"/>
           </a:p>
@@ -413,7 +413,7 @@
           <a:p>
             <a:fld id="{36315F81-BEF3-4F9B-AC41-522F2A5A8578}" type="datetimeFigureOut">
               <a:rPr lang="en-GH" smtClean="0"/>
-              <a:t>15/08/2024</a:t>
+              <a:t>20/08/2024</a:t>
             </a:fld>
             <a:endParaRPr lang="en-GH" dirty="0"/>
           </a:p>
@@ -593,7 +593,7 @@
           <a:p>
             <a:fld id="{36315F81-BEF3-4F9B-AC41-522F2A5A8578}" type="datetimeFigureOut">
               <a:rPr lang="en-GH" smtClean="0"/>
-              <a:t>15/08/2024</a:t>
+              <a:t>20/08/2024</a:t>
             </a:fld>
             <a:endParaRPr lang="en-GH" dirty="0"/>
           </a:p>
@@ -763,7 +763,7 @@
           <a:p>
             <a:fld id="{36315F81-BEF3-4F9B-AC41-522F2A5A8578}" type="datetimeFigureOut">
               <a:rPr lang="en-GH" smtClean="0"/>
-              <a:t>15/08/2024</a:t>
+              <a:t>20/08/2024</a:t>
             </a:fld>
             <a:endParaRPr lang="en-GH" dirty="0"/>
           </a:p>
@@ -1009,7 +1009,7 @@
           <a:p>
             <a:fld id="{36315F81-BEF3-4F9B-AC41-522F2A5A8578}" type="datetimeFigureOut">
               <a:rPr lang="en-GH" smtClean="0"/>
-              <a:t>15/08/2024</a:t>
+              <a:t>20/08/2024</a:t>
             </a:fld>
             <a:endParaRPr lang="en-GH" dirty="0"/>
           </a:p>
@@ -1241,7 +1241,7 @@
           <a:p>
             <a:fld id="{36315F81-BEF3-4F9B-AC41-522F2A5A8578}" type="datetimeFigureOut">
               <a:rPr lang="en-GH" smtClean="0"/>
-              <a:t>15/08/2024</a:t>
+              <a:t>20/08/2024</a:t>
             </a:fld>
             <a:endParaRPr lang="en-GH" dirty="0"/>
           </a:p>
@@ -1608,7 +1608,7 @@
           <a:p>
             <a:fld id="{36315F81-BEF3-4F9B-AC41-522F2A5A8578}" type="datetimeFigureOut">
               <a:rPr lang="en-GH" smtClean="0"/>
-              <a:t>15/08/2024</a:t>
+              <a:t>20/08/2024</a:t>
             </a:fld>
             <a:endParaRPr lang="en-GH" dirty="0"/>
           </a:p>
@@ -1726,7 +1726,7 @@
           <a:p>
             <a:fld id="{36315F81-BEF3-4F9B-AC41-522F2A5A8578}" type="datetimeFigureOut">
               <a:rPr lang="en-GH" smtClean="0"/>
-              <a:t>15/08/2024</a:t>
+              <a:t>20/08/2024</a:t>
             </a:fld>
             <a:endParaRPr lang="en-GH" dirty="0"/>
           </a:p>
@@ -1821,7 +1821,7 @@
           <a:p>
             <a:fld id="{36315F81-BEF3-4F9B-AC41-522F2A5A8578}" type="datetimeFigureOut">
               <a:rPr lang="en-GH" smtClean="0"/>
-              <a:t>15/08/2024</a:t>
+              <a:t>20/08/2024</a:t>
             </a:fld>
             <a:endParaRPr lang="en-GH" dirty="0"/>
           </a:p>
@@ -2098,7 +2098,7 @@
           <a:p>
             <a:fld id="{36315F81-BEF3-4F9B-AC41-522F2A5A8578}" type="datetimeFigureOut">
               <a:rPr lang="en-GH" smtClean="0"/>
-              <a:t>15/08/2024</a:t>
+              <a:t>20/08/2024</a:t>
             </a:fld>
             <a:endParaRPr lang="en-GH" dirty="0"/>
           </a:p>
@@ -2355,7 +2355,7 @@
           <a:p>
             <a:fld id="{36315F81-BEF3-4F9B-AC41-522F2A5A8578}" type="datetimeFigureOut">
               <a:rPr lang="en-GH" smtClean="0"/>
-              <a:t>15/08/2024</a:t>
+              <a:t>20/08/2024</a:t>
             </a:fld>
             <a:endParaRPr lang="en-GH" dirty="0"/>
           </a:p>
@@ -2568,7 +2568,7 @@
           <a:p>
             <a:fld id="{36315F81-BEF3-4F9B-AC41-522F2A5A8578}" type="datetimeFigureOut">
               <a:rPr lang="en-GH" smtClean="0"/>
-              <a:t>15/08/2024</a:t>
+              <a:t>20/08/2024</a:t>
             </a:fld>
             <a:endParaRPr lang="en-GH" dirty="0"/>
           </a:p>
@@ -3549,6 +3549,42 @@
           </p:pic>
         </p:grpSp>
       </p:grpSp>
+      <p:pic>
+        <p:nvPicPr>
+          <p:cNvPr id="7" name="Picture 6" descr="A pink banner with a megaphone and black text&#10;&#10;Description automatically generated">
+            <a:extLst>
+              <a:ext uri="{FF2B5EF4-FFF2-40B4-BE49-F238E27FC236}">
+                <a16:creationId xmlns:a16="http://schemas.microsoft.com/office/drawing/2014/main" id="{4641F877-77A2-A2C3-3F8D-5CD47D1349DD}"/>
+              </a:ext>
+            </a:extLst>
+          </p:cNvPr>
+          <p:cNvPicPr>
+            <a:picLocks noChangeAspect="1"/>
+          </p:cNvPicPr>
+          <p:nvPr/>
+        </p:nvPicPr>
+        <p:blipFill>
+          <a:blip r:embed="rId8">
+            <a:extLst>
+              <a:ext uri="{28A0092B-C50C-407E-A947-70E740481C1C}">
+                <a14:useLocalDpi xmlns:a14="http://schemas.microsoft.com/office/drawing/2010/main" val="0"/>
+              </a:ext>
+            </a:extLst>
+          </a:blip>
+          <a:stretch>
+            <a:fillRect/>
+          </a:stretch>
+        </p:blipFill>
+        <p:spPr>
+          <a:xfrm>
+            <a:off x="8157415" y="7055047"/>
+            <a:ext cx="9794578" cy="6229767"/>
+          </a:xfrm>
+          <a:prstGeom prst="rect">
+            <a:avLst/>
+          </a:prstGeom>
+        </p:spPr>
+      </p:pic>
     </p:spTree>
     <p:extLst>
       <p:ext uri="{BB962C8B-B14F-4D97-AF65-F5344CB8AC3E}">

</xml_diff>